<commit_message>
Re-ordered slides for clarity
</commit_message>
<xml_diff>
--- a/slides/QLS-MiCM Statistics in R Fall 2024.pptx
+++ b/slides/QLS-MiCM Statistics in R Fall 2024.pptx
@@ -32,13 +32,13 @@
     <p:sldId id="463" r:id="rId20"/>
     <p:sldId id="478" r:id="rId21"/>
     <p:sldId id="477" r:id="rId22"/>
-    <p:sldId id="450" r:id="rId23"/>
-    <p:sldId id="455" r:id="rId24"/>
-    <p:sldId id="465" r:id="rId25"/>
-    <p:sldId id="469" r:id="rId26"/>
-    <p:sldId id="467" r:id="rId27"/>
-    <p:sldId id="471" r:id="rId28"/>
-    <p:sldId id="475" r:id="rId29"/>
+    <p:sldId id="471" r:id="rId23"/>
+    <p:sldId id="475" r:id="rId24"/>
+    <p:sldId id="450" r:id="rId25"/>
+    <p:sldId id="455" r:id="rId26"/>
+    <p:sldId id="465" r:id="rId27"/>
+    <p:sldId id="469" r:id="rId28"/>
+    <p:sldId id="467" r:id="rId29"/>
     <p:sldId id="451" r:id="rId30"/>
     <p:sldId id="457" r:id="rId31"/>
     <p:sldId id="474" r:id="rId32"/>
@@ -163,7 +163,7 @@
 <file path=ppt/revisionInfo.xml><?xml version="1.0" encoding="utf-8"?>
 <p1510:revInfo xmlns:a="http://schemas.openxmlformats.org/drawingml/2006/main" xmlns:r="http://schemas.openxmlformats.org/officeDocument/2006/relationships" xmlns:p1510="http://schemas.microsoft.com/office/powerpoint/2015/10/main">
   <p1510:revLst>
-    <p1510:client id="{68D50CE0-6F29-49CE-9181-508326FA075A}" v="1150" dt="2024-11-18T14:07:58.769"/>
+    <p1510:client id="{68D50CE0-6F29-49CE-9181-508326FA075A}" v="1173" dt="2024-11-18T17:01:12.222"/>
   </p1510:revLst>
 </p1510:revInfo>
 </file>
@@ -173,7 +173,7 @@
   <pc:docChgLst>
     <pc:chgData name="Adrien Osakwe" userId="7a3e290c-eb83-484b-8e3d-d46ef2333477" providerId="ADAL" clId="{68D50CE0-6F29-49CE-9181-508326FA075A}"/>
     <pc:docChg chg="undo redo custSel addSld delSld modSld sldOrd modMainMaster">
-      <pc:chgData name="Adrien Osakwe" userId="7a3e290c-eb83-484b-8e3d-d46ef2333477" providerId="ADAL" clId="{68D50CE0-6F29-49CE-9181-508326FA075A}" dt="2024-11-18T14:09:00.512" v="11571" actId="20577"/>
+      <pc:chgData name="Adrien Osakwe" userId="7a3e290c-eb83-484b-8e3d-d46ef2333477" providerId="ADAL" clId="{68D50CE0-6F29-49CE-9181-508326FA075A}" dt="2024-11-18T17:01:12.222" v="11607" actId="20577"/>
       <pc:docMkLst>
         <pc:docMk/>
       </pc:docMkLst>
@@ -535,7 +535,7 @@
         </pc:spChg>
       </pc:sldChg>
       <pc:sldChg chg="addSp delSp modSp new mod delAnim modAnim">
-        <pc:chgData name="Adrien Osakwe" userId="7a3e290c-eb83-484b-8e3d-d46ef2333477" providerId="ADAL" clId="{68D50CE0-6F29-49CE-9181-508326FA075A}" dt="2024-11-18T14:08:01.634" v="11569" actId="1076"/>
+        <pc:chgData name="Adrien Osakwe" userId="7a3e290c-eb83-484b-8e3d-d46ef2333477" providerId="ADAL" clId="{68D50CE0-6F29-49CE-9181-508326FA075A}" dt="2024-11-18T15:42:33.675" v="11579" actId="1076"/>
         <pc:sldMkLst>
           <pc:docMk/>
           <pc:sldMk cId="401542667" sldId="455"/>
@@ -554,6 +554,14 @@
             <pc:docMk/>
             <pc:sldMk cId="401542667" sldId="455"/>
             <ac:spMk id="3" creationId="{8DB4E871-E104-6882-2745-47F74AF22706}"/>
+          </ac:spMkLst>
+        </pc:spChg>
+        <pc:spChg chg="add mod">
+          <ac:chgData name="Adrien Osakwe" userId="7a3e290c-eb83-484b-8e3d-d46ef2333477" providerId="ADAL" clId="{68D50CE0-6F29-49CE-9181-508326FA075A}" dt="2024-11-18T15:42:33.675" v="11579" actId="1076"/>
+          <ac:spMkLst>
+            <pc:docMk/>
+            <pc:sldMk cId="401542667" sldId="455"/>
+            <ac:spMk id="4" creationId="{5D5743EF-03EC-1477-8BCB-379D06A8F5D7}"/>
           </ac:spMkLst>
         </pc:spChg>
         <pc:spChg chg="add del mod">
@@ -605,7 +613,7 @@
           </ac:picMkLst>
         </pc:picChg>
         <pc:picChg chg="add mod">
-          <ac:chgData name="Adrien Osakwe" userId="7a3e290c-eb83-484b-8e3d-d46ef2333477" providerId="ADAL" clId="{68D50CE0-6F29-49CE-9181-508326FA075A}" dt="2024-11-17T01:42:22.296" v="3985" actId="1076"/>
+          <ac:chgData name="Adrien Osakwe" userId="7a3e290c-eb83-484b-8e3d-d46ef2333477" providerId="ADAL" clId="{68D50CE0-6F29-49CE-9181-508326FA075A}" dt="2024-11-18T15:42:20.641" v="11574" actId="14100"/>
           <ac:picMkLst>
             <pc:docMk/>
             <pc:sldMk cId="401542667" sldId="455"/>
@@ -1002,7 +1010,7 @@
         </pc:spChg>
       </pc:sldChg>
       <pc:sldChg chg="modSp new mod ord">
-        <pc:chgData name="Adrien Osakwe" userId="7a3e290c-eb83-484b-8e3d-d46ef2333477" providerId="ADAL" clId="{68D50CE0-6F29-49CE-9181-508326FA075A}" dt="2024-11-17T14:31:44.322" v="5951" actId="113"/>
+        <pc:chgData name="Adrien Osakwe" userId="7a3e290c-eb83-484b-8e3d-d46ef2333477" providerId="ADAL" clId="{68D50CE0-6F29-49CE-9181-508326FA075A}" dt="2024-11-18T16:59:18.200" v="11585"/>
         <pc:sldMkLst>
           <pc:docMk/>
           <pc:sldMk cId="760899132" sldId="467"/>
@@ -1157,8 +1165,8 @@
           </ac:picMkLst>
         </pc:picChg>
       </pc:sldChg>
-      <pc:sldChg chg="addSp delSp modSp new mod ord setBg">
-        <pc:chgData name="Adrien Osakwe" userId="7a3e290c-eb83-484b-8e3d-d46ef2333477" providerId="ADAL" clId="{68D50CE0-6F29-49CE-9181-508326FA075A}" dt="2024-11-18T14:09:00.512" v="11571" actId="20577"/>
+      <pc:sldChg chg="addSp delSp modSp new del mod ord setBg">
+        <pc:chgData name="Adrien Osakwe" userId="7a3e290c-eb83-484b-8e3d-d46ef2333477" providerId="ADAL" clId="{68D50CE0-6F29-49CE-9181-508326FA075A}" dt="2024-11-18T16:59:24.384" v="11586" actId="2696"/>
         <pc:sldMkLst>
           <pc:docMk/>
           <pc:sldMk cId="1000633892" sldId="471"/>
@@ -1227,6 +1235,13 @@
             <ac:picMk id="9218" creationId="{6E410117-D63E-D18C-891D-0E74E617E39A}"/>
           </ac:picMkLst>
         </pc:picChg>
+      </pc:sldChg>
+      <pc:sldChg chg="add">
+        <pc:chgData name="Adrien Osakwe" userId="7a3e290c-eb83-484b-8e3d-d46ef2333477" providerId="ADAL" clId="{68D50CE0-6F29-49CE-9181-508326FA075A}" dt="2024-11-18T16:59:28.827" v="11587"/>
+        <pc:sldMkLst>
+          <pc:docMk/>
+          <pc:sldMk cId="1291056166" sldId="471"/>
+        </pc:sldMkLst>
       </pc:sldChg>
       <pc:sldChg chg="modSp new mod modAnim">
         <pc:chgData name="Adrien Osakwe" userId="7a3e290c-eb83-484b-8e3d-d46ef2333477" providerId="ADAL" clId="{68D50CE0-6F29-49CE-9181-508326FA075A}" dt="2024-11-17T21:46:14.534" v="11103" actId="114"/>
@@ -1321,8 +1336,8 @@
           </ac:picMkLst>
         </pc:picChg>
       </pc:sldChg>
-      <pc:sldChg chg="addSp modSp new mod">
-        <pc:chgData name="Adrien Osakwe" userId="7a3e290c-eb83-484b-8e3d-d46ef2333477" providerId="ADAL" clId="{68D50CE0-6F29-49CE-9181-508326FA075A}" dt="2024-11-17T14:36:54.798" v="6384" actId="1076"/>
+      <pc:sldChg chg="addSp modSp new del mod ord">
+        <pc:chgData name="Adrien Osakwe" userId="7a3e290c-eb83-484b-8e3d-d46ef2333477" providerId="ADAL" clId="{68D50CE0-6F29-49CE-9181-508326FA075A}" dt="2024-11-18T16:59:24.384" v="11586" actId="2696"/>
         <pc:sldMkLst>
           <pc:docMk/>
           <pc:sldMk cId="443152693" sldId="475"/>
@@ -1359,6 +1374,13 @@
             <ac:picMk id="1026" creationId="{4B9737DD-DF68-9500-CA63-977850AACB2C}"/>
           </ac:picMkLst>
         </pc:picChg>
+      </pc:sldChg>
+      <pc:sldChg chg="add">
+        <pc:chgData name="Adrien Osakwe" userId="7a3e290c-eb83-484b-8e3d-d46ef2333477" providerId="ADAL" clId="{68D50CE0-6F29-49CE-9181-508326FA075A}" dt="2024-11-18T16:59:28.827" v="11587"/>
+        <pc:sldMkLst>
+          <pc:docMk/>
+          <pc:sldMk cId="4253093352" sldId="475"/>
+        </pc:sldMkLst>
       </pc:sldChg>
       <pc:sldChg chg="modSp new mod ord">
         <pc:chgData name="Adrien Osakwe" userId="7a3e290c-eb83-484b-8e3d-d46ef2333477" providerId="ADAL" clId="{68D50CE0-6F29-49CE-9181-508326FA075A}" dt="2024-11-17T22:44:00.823" v="11520"/>
@@ -1454,7 +1476,7 @@
         </pc:picChg>
       </pc:sldChg>
       <pc:sldChg chg="modSp new mod ord">
-        <pc:chgData name="Adrien Osakwe" userId="7a3e290c-eb83-484b-8e3d-d46ef2333477" providerId="ADAL" clId="{68D50CE0-6F29-49CE-9181-508326FA075A}" dt="2024-11-17T22:44:00.823" v="11520"/>
+        <pc:chgData name="Adrien Osakwe" userId="7a3e290c-eb83-484b-8e3d-d46ef2333477" providerId="ADAL" clId="{68D50CE0-6F29-49CE-9181-508326FA075A}" dt="2024-11-18T17:01:12.222" v="11607" actId="20577"/>
         <pc:sldMkLst>
           <pc:docMk/>
           <pc:sldMk cId="3592411448" sldId="479"/>
@@ -1468,7 +1490,7 @@
           </ac:spMkLst>
         </pc:spChg>
         <pc:spChg chg="mod">
-          <ac:chgData name="Adrien Osakwe" userId="7a3e290c-eb83-484b-8e3d-d46ef2333477" providerId="ADAL" clId="{68D50CE0-6F29-49CE-9181-508326FA075A}" dt="2024-11-17T17:48:26.902" v="9684" actId="27636"/>
+          <ac:chgData name="Adrien Osakwe" userId="7a3e290c-eb83-484b-8e3d-d46ef2333477" providerId="ADAL" clId="{68D50CE0-6F29-49CE-9181-508326FA075A}" dt="2024-11-18T17:01:12.222" v="11607" actId="20577"/>
           <ac:spMkLst>
             <pc:docMk/>
             <pc:sldMk cId="3592411448" sldId="479"/>
@@ -6733,8 +6755,8 @@
           </a:p>
         </p:txBody>
       </p:sp>
-      <mc:AlternateContent xmlns:mc="http://schemas.openxmlformats.org/markup-compatibility/2006" xmlns:a14="http://schemas.microsoft.com/office/drawing/2010/main">
-        <mc:Choice Requires="a14">
+      <mc:AlternateContent xmlns:mc="http://schemas.openxmlformats.org/markup-compatibility/2006">
+        <mc:Choice xmlns:a14="http://schemas.microsoft.com/office/drawing/2010/main" Requires="a14">
           <p:sp>
             <p:nvSpPr>
               <p:cNvPr id="3" name="Text Placeholder 2">
@@ -7010,7 +7032,7 @@
             </p:txBody>
           </p:sp>
         </mc:Choice>
-        <mc:Fallback xmlns="">
+        <mc:Fallback>
           <p:sp>
             <p:nvSpPr>
               <p:cNvPr id="3" name="Text Placeholder 2">
@@ -7939,6 +7961,509 @@
   <p:cSld>
     <p:spTree>
       <p:nvGrpSpPr>
+        <p:cNvPr id="1" name=""/>
+        <p:cNvGrpSpPr/>
+        <p:nvPr/>
+      </p:nvGrpSpPr>
+      <p:grpSpPr>
+        <a:xfrm>
+          <a:off x="0" y="0"/>
+          <a:ext cx="0" cy="0"/>
+          <a:chOff x="0" y="0"/>
+          <a:chExt cx="0" cy="0"/>
+        </a:xfrm>
+      </p:grpSpPr>
+      <p:sp>
+        <p:nvSpPr>
+          <p:cNvPr id="2" name="Title 1">
+            <a:extLst>
+              <a:ext uri="{FF2B5EF4-FFF2-40B4-BE49-F238E27FC236}">
+                <a16:creationId xmlns:a16="http://schemas.microsoft.com/office/drawing/2014/main" id="{2E7D397F-CE0B-EB20-A6D1-2EB5AF5A80D7}"/>
+              </a:ext>
+            </a:extLst>
+          </p:cNvPr>
+          <p:cNvSpPr>
+            <a:spLocks noGrp="1"/>
+          </p:cNvSpPr>
+          <p:nvPr>
+            <p:ph type="title"/>
+          </p:nvPr>
+        </p:nvSpPr>
+        <p:spPr/>
+        <p:txBody>
+          <a:bodyPr/>
+          <a:lstStyle/>
+          <a:p>
+            <a:r>
+              <a:rPr lang="en-CA" dirty="0"/>
+              <a:t>Confidence Intervals</a:t>
+            </a:r>
+            <a:endParaRPr lang="en-US" dirty="0"/>
+          </a:p>
+        </p:txBody>
+      </p:sp>
+      <mc:AlternateContent xmlns:mc="http://schemas.openxmlformats.org/markup-compatibility/2006" xmlns:a14="http://schemas.microsoft.com/office/drawing/2010/main">
+        <mc:Choice Requires="a14">
+          <p:sp>
+            <p:nvSpPr>
+              <p:cNvPr id="3" name="Text Placeholder 2">
+                <a:extLst>
+                  <a:ext uri="{FF2B5EF4-FFF2-40B4-BE49-F238E27FC236}">
+                    <a16:creationId xmlns:a16="http://schemas.microsoft.com/office/drawing/2014/main" id="{15CB0082-C2BE-0282-EF44-77975DEDF22D}"/>
+                  </a:ext>
+                </a:extLst>
+              </p:cNvPr>
+              <p:cNvSpPr>
+                <a:spLocks noGrp="1"/>
+              </p:cNvSpPr>
+              <p:nvPr>
+                <p:ph type="body" idx="1"/>
+              </p:nvPr>
+            </p:nvSpPr>
+            <p:spPr>
+              <a:xfrm>
+                <a:off x="628650" y="1643432"/>
+                <a:ext cx="4134426" cy="4606723"/>
+              </a:xfrm>
+            </p:spPr>
+            <p:txBody>
+              <a:bodyPr/>
+              <a:lstStyle/>
+              <a:p>
+                <a:pPr marL="342900" indent="-342900">
+                  <a:buFont typeface="Arial" panose="020B0604020202020204" pitchFamily="34" charset="0"/>
+                  <a:buChar char="•"/>
+                </a:pPr>
+                <a:r>
+                  <a:rPr lang="en-CA" dirty="0"/>
+                  <a:t>We may want to attribute a range to our estimate</a:t>
+                </a:r>
+              </a:p>
+              <a:p>
+                <a:pPr marL="342900" indent="-342900">
+                  <a:buFont typeface="Arial" panose="020B0604020202020204" pitchFamily="34" charset="0"/>
+                  <a:buChar char="•"/>
+                </a:pPr>
+                <a:endParaRPr lang="en-CA" dirty="0"/>
+              </a:p>
+              <a:p>
+                <a:pPr marL="342900" indent="-342900">
+                  <a:buFont typeface="Arial" panose="020B0604020202020204" pitchFamily="34" charset="0"/>
+                  <a:buChar char="•"/>
+                </a:pPr>
+                <a:r>
+                  <a:rPr lang="en-CA" dirty="0"/>
+                  <a:t>Can be calculated with the </a:t>
+                </a:r>
+                <a:r>
+                  <a:rPr lang="en-CA" b="1" dirty="0"/>
+                  <a:t>margin of error</a:t>
+                </a:r>
+              </a:p>
+              <a:p>
+                <a:pPr/>
+                <a14:m>
+                  <m:oMathPara xmlns:m="http://schemas.openxmlformats.org/officeDocument/2006/math">
+                    <m:oMathParaPr>
+                      <m:jc m:val="centerGroup"/>
+                    </m:oMathParaPr>
+                    <m:oMath xmlns:m="http://schemas.openxmlformats.org/officeDocument/2006/math">
+                      <m:r>
+                        <a:rPr lang="en-CA" b="0" i="1" smtClean="0">
+                          <a:latin typeface="Cambria Math" panose="02040503050406030204" pitchFamily="18" charset="0"/>
+                        </a:rPr>
+                        <m:t>𝐸</m:t>
+                      </m:r>
+                      <m:r>
+                        <a:rPr lang="en-CA" b="0" i="1" smtClean="0">
+                          <a:latin typeface="Cambria Math" panose="02040503050406030204" pitchFamily="18" charset="0"/>
+                        </a:rPr>
+                        <m:t>=</m:t>
+                      </m:r>
+                      <m:r>
+                        <a:rPr lang="en-CA" b="0" i="1" smtClean="0">
+                          <a:latin typeface="Cambria Math" panose="02040503050406030204" pitchFamily="18" charset="0"/>
+                        </a:rPr>
+                        <m:t>𝑍</m:t>
+                      </m:r>
+                      <m:f>
+                        <m:fPr>
+                          <m:ctrlPr>
+                            <a:rPr lang="en-CA" b="0" i="1" smtClean="0">
+                              <a:latin typeface="Cambria Math" panose="02040503050406030204" pitchFamily="18" charset="0"/>
+                            </a:rPr>
+                          </m:ctrlPr>
+                        </m:fPr>
+                        <m:num>
+                          <m:r>
+                            <a:rPr lang="en-CA" b="0" i="1" smtClean="0">
+                              <a:latin typeface="Cambria Math" panose="02040503050406030204" pitchFamily="18" charset="0"/>
+                            </a:rPr>
+                            <m:t>𝜎</m:t>
+                          </m:r>
+                        </m:num>
+                        <m:den>
+                          <m:rad>
+                            <m:radPr>
+                              <m:degHide m:val="on"/>
+                              <m:ctrlPr>
+                                <a:rPr lang="en-CA" b="0" i="1" smtClean="0">
+                                  <a:latin typeface="Cambria Math" panose="02040503050406030204" pitchFamily="18" charset="0"/>
+                                </a:rPr>
+                              </m:ctrlPr>
+                            </m:radPr>
+                            <m:deg/>
+                            <m:e>
+                              <m:r>
+                                <a:rPr lang="en-CA" b="0" i="1" smtClean="0">
+                                  <a:latin typeface="Cambria Math" panose="02040503050406030204" pitchFamily="18" charset="0"/>
+                                </a:rPr>
+                                <m:t>𝑛</m:t>
+                              </m:r>
+                            </m:e>
+                          </m:rad>
+                        </m:den>
+                      </m:f>
+                    </m:oMath>
+                  </m:oMathPara>
+                </a14:m>
+                <a:endParaRPr lang="en-CA" b="0" dirty="0"/>
+              </a:p>
+              <a:p>
+                <a:pPr marL="342900" indent="-342900">
+                  <a:buFont typeface="Arial" panose="020B0604020202020204" pitchFamily="34" charset="0"/>
+                  <a:buChar char="•"/>
+                </a:pPr>
+                <a:endParaRPr lang="en-CA" dirty="0"/>
+              </a:p>
+              <a:p>
+                <a:pPr marL="342900" indent="-342900">
+                  <a:buFont typeface="Arial" panose="020B0604020202020204" pitchFamily="34" charset="0"/>
+                  <a:buChar char="•"/>
+                </a:pPr>
+                <a:r>
+                  <a:rPr lang="en-CA" dirty="0"/>
+                  <a:t>Where Z is the z-score that defines our confidence level</a:t>
+                </a:r>
+              </a:p>
+            </p:txBody>
+          </p:sp>
+        </mc:Choice>
+        <mc:Fallback xmlns="">
+          <p:sp>
+            <p:nvSpPr>
+              <p:cNvPr id="3" name="Text Placeholder 2">
+                <a:extLst>
+                  <a:ext uri="{FF2B5EF4-FFF2-40B4-BE49-F238E27FC236}">
+                    <a16:creationId xmlns:a16="http://schemas.microsoft.com/office/drawing/2014/main" id="{15CB0082-C2BE-0282-EF44-77975DEDF22D}"/>
+                  </a:ext>
+                </a:extLst>
+              </p:cNvPr>
+              <p:cNvSpPr>
+                <a:spLocks noGrp="1" noRot="1" noChangeAspect="1" noMove="1" noResize="1" noEditPoints="1" noAdjustHandles="1" noChangeArrowheads="1" noChangeShapeType="1" noTextEdit="1"/>
+              </p:cNvSpPr>
+              <p:nvPr>
+                <p:ph type="body" idx="1"/>
+              </p:nvPr>
+            </p:nvSpPr>
+            <p:spPr>
+              <a:xfrm>
+                <a:off x="628650" y="1643432"/>
+                <a:ext cx="4134426" cy="4606723"/>
+              </a:xfrm>
+              <a:blipFill>
+                <a:blip r:embed="rId2"/>
+                <a:stretch>
+                  <a:fillRect l="-1917" t="-1854"/>
+                </a:stretch>
+              </a:blipFill>
+            </p:spPr>
+            <p:txBody>
+              <a:bodyPr/>
+              <a:lstStyle/>
+              <a:p>
+                <a:r>
+                  <a:rPr lang="en-US">
+                    <a:noFill/>
+                  </a:rPr>
+                  <a:t> </a:t>
+                </a:r>
+              </a:p>
+            </p:txBody>
+          </p:sp>
+        </mc:Fallback>
+      </mc:AlternateContent>
+      <p:pic>
+        <p:nvPicPr>
+          <p:cNvPr id="9218" name="Picture 2">
+            <a:extLst>
+              <a:ext uri="{FF2B5EF4-FFF2-40B4-BE49-F238E27FC236}">
+                <a16:creationId xmlns:a16="http://schemas.microsoft.com/office/drawing/2014/main" id="{6E410117-D63E-D18C-891D-0E74E617E39A}"/>
+              </a:ext>
+            </a:extLst>
+          </p:cNvPr>
+          <p:cNvPicPr>
+            <a:picLocks noChangeAspect="1" noChangeArrowheads="1"/>
+          </p:cNvPicPr>
+          <p:nvPr/>
+        </p:nvPicPr>
+        <p:blipFill>
+          <a:blip r:embed="rId3">
+            <a:extLst>
+              <a:ext uri="{28A0092B-C50C-407E-A947-70E740481C1C}">
+                <a14:useLocalDpi xmlns:a14="http://schemas.microsoft.com/office/drawing/2010/main" val="0"/>
+              </a:ext>
+            </a:extLst>
+          </a:blip>
+          <a:srcRect/>
+          <a:stretch>
+            <a:fillRect/>
+          </a:stretch>
+        </p:blipFill>
+        <p:spPr bwMode="auto">
+          <a:xfrm>
+            <a:off x="5286375" y="2243014"/>
+            <a:ext cx="3790950" cy="3291234"/>
+          </a:xfrm>
+          <a:prstGeom prst="rect">
+            <a:avLst/>
+          </a:prstGeom>
+          <a:noFill/>
+          <a:extLst>
+            <a:ext uri="{909E8E84-426E-40DD-AFC4-6F175D3DCCD1}">
+              <a14:hiddenFill xmlns:a14="http://schemas.microsoft.com/office/drawing/2010/main">
+                <a:solidFill>
+                  <a:srgbClr val="FFFFFF"/>
+                </a:solidFill>
+              </a14:hiddenFill>
+            </a:ext>
+          </a:extLst>
+        </p:spPr>
+      </p:pic>
+    </p:spTree>
+    <p:extLst>
+      <p:ext uri="{BB962C8B-B14F-4D97-AF65-F5344CB8AC3E}">
+        <p14:creationId xmlns:p14="http://schemas.microsoft.com/office/powerpoint/2010/main" val="1291056166"/>
+      </p:ext>
+    </p:extLst>
+  </p:cSld>
+  <p:clrMapOvr>
+    <a:masterClrMapping/>
+  </p:clrMapOvr>
+</p:sld>
+</file>
+
+<file path=ppt/slides/slide23.xml><?xml version="1.0" encoding="utf-8"?>
+<p:sld xmlns:a="http://schemas.openxmlformats.org/drawingml/2006/main" xmlns:r="http://schemas.openxmlformats.org/officeDocument/2006/relationships" xmlns:p="http://schemas.openxmlformats.org/presentationml/2006/main">
+  <p:cSld>
+    <p:spTree>
+      <p:nvGrpSpPr>
+        <p:cNvPr id="1" name=""/>
+        <p:cNvGrpSpPr/>
+        <p:nvPr/>
+      </p:nvGrpSpPr>
+      <p:grpSpPr>
+        <a:xfrm>
+          <a:off x="0" y="0"/>
+          <a:ext cx="0" cy="0"/>
+          <a:chOff x="0" y="0"/>
+          <a:chExt cx="0" cy="0"/>
+        </a:xfrm>
+      </p:grpSpPr>
+      <p:sp>
+        <p:nvSpPr>
+          <p:cNvPr id="2" name="Title 1">
+            <a:extLst>
+              <a:ext uri="{FF2B5EF4-FFF2-40B4-BE49-F238E27FC236}">
+                <a16:creationId xmlns:a16="http://schemas.microsoft.com/office/drawing/2014/main" id="{5568DD53-0E60-48D4-A0EE-A8930702EFE2}"/>
+              </a:ext>
+            </a:extLst>
+          </p:cNvPr>
+          <p:cNvSpPr>
+            <a:spLocks noGrp="1"/>
+          </p:cNvSpPr>
+          <p:nvPr>
+            <p:ph type="title"/>
+          </p:nvPr>
+        </p:nvSpPr>
+        <p:spPr/>
+        <p:txBody>
+          <a:bodyPr>
+            <a:normAutofit fontScale="90000"/>
+          </a:bodyPr>
+          <a:lstStyle/>
+          <a:p>
+            <a:r>
+              <a:rPr lang="en-CA" dirty="0"/>
+              <a:t>PSA: Confidence Intervals</a:t>
+            </a:r>
+            <a:endParaRPr lang="en-US" dirty="0"/>
+          </a:p>
+        </p:txBody>
+      </p:sp>
+      <p:sp>
+        <p:nvSpPr>
+          <p:cNvPr id="3" name="Text Placeholder 2">
+            <a:extLst>
+              <a:ext uri="{FF2B5EF4-FFF2-40B4-BE49-F238E27FC236}">
+                <a16:creationId xmlns:a16="http://schemas.microsoft.com/office/drawing/2014/main" id="{F96E63DE-6149-CC4F-C3C8-3C7CD447355A}"/>
+              </a:ext>
+            </a:extLst>
+          </p:cNvPr>
+          <p:cNvSpPr>
+            <a:spLocks noGrp="1"/>
+          </p:cNvSpPr>
+          <p:nvPr>
+            <p:ph type="body" idx="1"/>
+          </p:nvPr>
+        </p:nvSpPr>
+        <p:spPr>
+          <a:xfrm>
+            <a:off x="194332" y="2476984"/>
+            <a:ext cx="4377668" cy="3426106"/>
+          </a:xfrm>
+        </p:spPr>
+        <p:txBody>
+          <a:bodyPr>
+            <a:normAutofit fontScale="92500"/>
+          </a:bodyPr>
+          <a:lstStyle/>
+          <a:p>
+            <a:r>
+              <a:rPr lang="en-CA" dirty="0"/>
+              <a:t>A  95% CI </a:t>
+            </a:r>
+            <a:r>
+              <a:rPr lang="en-CA" b="1" dirty="0"/>
+              <a:t>DOES NOT mean </a:t>
+            </a:r>
+            <a:r>
+              <a:rPr lang="en-CA" dirty="0"/>
+              <a:t>there is a 95% chance the true value is in that range</a:t>
+            </a:r>
+          </a:p>
+          <a:p>
+            <a:endParaRPr lang="en-CA" dirty="0"/>
+          </a:p>
+          <a:p>
+            <a:r>
+              <a:rPr lang="en-CA" b="1" dirty="0"/>
+              <a:t>For multiple experiments, 95% of CIs will overlap with the true value</a:t>
+            </a:r>
+          </a:p>
+          <a:p>
+            <a:endParaRPr lang="en-CA" sz="2000" b="1" dirty="0"/>
+          </a:p>
+          <a:p>
+            <a:r>
+              <a:rPr lang="en-CA" b="1" dirty="0"/>
+              <a:t>Consider a Bayesian formulation instead (beyond scope)</a:t>
+            </a:r>
+            <a:endParaRPr lang="en-US" b="1" dirty="0"/>
+          </a:p>
+        </p:txBody>
+      </p:sp>
+      <p:pic>
+        <p:nvPicPr>
+          <p:cNvPr id="1026" name="Picture 2" descr="undefined">
+            <a:extLst>
+              <a:ext uri="{FF2B5EF4-FFF2-40B4-BE49-F238E27FC236}">
+                <a16:creationId xmlns:a16="http://schemas.microsoft.com/office/drawing/2014/main" id="{4B9737DD-DF68-9500-CA63-977850AACB2C}"/>
+              </a:ext>
+            </a:extLst>
+          </p:cNvPr>
+          <p:cNvPicPr>
+            <a:picLocks noChangeAspect="1" noChangeArrowheads="1"/>
+          </p:cNvPicPr>
+          <p:nvPr/>
+        </p:nvPicPr>
+        <p:blipFill>
+          <a:blip r:embed="rId2">
+            <a:extLst>
+              <a:ext uri="{28A0092B-C50C-407E-A947-70E740481C1C}">
+                <a14:useLocalDpi xmlns:a14="http://schemas.microsoft.com/office/drawing/2010/main" val="0"/>
+              </a:ext>
+            </a:extLst>
+          </a:blip>
+          <a:srcRect/>
+          <a:stretch>
+            <a:fillRect/>
+          </a:stretch>
+        </p:blipFill>
+        <p:spPr bwMode="auto">
+          <a:xfrm>
+            <a:off x="4572000" y="1643432"/>
+            <a:ext cx="4470265" cy="4470265"/>
+          </a:xfrm>
+          <a:prstGeom prst="rect">
+            <a:avLst/>
+          </a:prstGeom>
+          <a:noFill/>
+          <a:extLst>
+            <a:ext uri="{909E8E84-426E-40DD-AFC4-6F175D3DCCD1}">
+              <a14:hiddenFill xmlns:a14="http://schemas.microsoft.com/office/drawing/2010/main">
+                <a:solidFill>
+                  <a:srgbClr val="FFFFFF"/>
+                </a:solidFill>
+              </a14:hiddenFill>
+            </a:ext>
+          </a:extLst>
+        </p:spPr>
+      </p:pic>
+      <p:sp>
+        <p:nvSpPr>
+          <p:cNvPr id="4" name="TextBox 3">
+            <a:extLst>
+              <a:ext uri="{FF2B5EF4-FFF2-40B4-BE49-F238E27FC236}">
+                <a16:creationId xmlns:a16="http://schemas.microsoft.com/office/drawing/2014/main" id="{CCF16B3C-8FD9-EF69-6A29-E55F05E405EE}"/>
+              </a:ext>
+            </a:extLst>
+          </p:cNvPr>
+          <p:cNvSpPr txBox="1"/>
+          <p:nvPr/>
+        </p:nvSpPr>
+        <p:spPr>
+          <a:xfrm>
+            <a:off x="7072132" y="1643432"/>
+            <a:ext cx="868101" cy="369460"/>
+          </a:xfrm>
+          <a:prstGeom prst="rect">
+            <a:avLst/>
+          </a:prstGeom>
+          <a:noFill/>
+        </p:spPr>
+        <p:txBody>
+          <a:bodyPr wrap="square" rtlCol="0">
+            <a:spAutoFit/>
+          </a:bodyPr>
+          <a:lstStyle/>
+          <a:p>
+            <a:r>
+              <a:rPr lang="en-CA" b="1" dirty="0"/>
+              <a:t>50% CI</a:t>
+            </a:r>
+            <a:endParaRPr lang="en-US" b="1" dirty="0"/>
+          </a:p>
+        </p:txBody>
+      </p:sp>
+    </p:spTree>
+    <p:extLst>
+      <p:ext uri="{BB962C8B-B14F-4D97-AF65-F5344CB8AC3E}">
+        <p14:creationId xmlns:p14="http://schemas.microsoft.com/office/powerpoint/2010/main" val="4253093352"/>
+      </p:ext>
+    </p:extLst>
+  </p:cSld>
+  <p:clrMapOvr>
+    <a:masterClrMapping/>
+  </p:clrMapOvr>
+</p:sld>
+</file>
+
+<file path=ppt/slides/slide24.xml><?xml version="1.0" encoding="utf-8"?>
+<p:sld xmlns:a="http://schemas.openxmlformats.org/drawingml/2006/main" xmlns:r="http://schemas.openxmlformats.org/officeDocument/2006/relationships" xmlns:p="http://schemas.openxmlformats.org/presentationml/2006/main">
+  <p:cSld>
+    <p:spTree>
+      <p:nvGrpSpPr>
         <p:cNvPr id="1" name="">
           <a:extLst>
             <a:ext uri="{FF2B5EF4-FFF2-40B4-BE49-F238E27FC236}">
@@ -8071,7 +8596,7 @@
 </p:sld>
 </file>
 
-<file path=ppt/slides/slide23.xml><?xml version="1.0" encoding="utf-8"?>
+<file path=ppt/slides/slide25.xml><?xml version="1.0" encoding="utf-8"?>
 <p:sld xmlns:a="http://schemas.openxmlformats.org/drawingml/2006/main" xmlns:r="http://schemas.openxmlformats.org/officeDocument/2006/relationships" xmlns:p="http://schemas.openxmlformats.org/presentationml/2006/main">
   <p:cSld>
     <p:spTree>
@@ -8229,8 +8754,8 @@
           </a:p>
         </p:txBody>
       </p:sp>
-      <mc:AlternateContent xmlns:mc="http://schemas.openxmlformats.org/markup-compatibility/2006">
-        <mc:Choice xmlns:a14="http://schemas.microsoft.com/office/drawing/2010/main" Requires="a14">
+      <mc:AlternateContent xmlns:mc="http://schemas.openxmlformats.org/markup-compatibility/2006" xmlns:a14="http://schemas.microsoft.com/office/drawing/2010/main">
+        <mc:Choice Requires="a14">
           <p:sp>
             <p:nvSpPr>
               <p:cNvPr id="8" name="TextBox 7">
@@ -8328,7 +8853,7 @@
             </p:txBody>
           </p:sp>
         </mc:Choice>
-        <mc:Fallback>
+        <mc:Fallback xmlns="">
           <p:sp>
             <p:nvSpPr>
               <p:cNvPr id="8" name="TextBox 7">
@@ -8402,8 +8927,8 @@
         </p:blipFill>
         <p:spPr bwMode="auto">
           <a:xfrm>
-            <a:off x="6909831" y="16829"/>
-            <a:ext cx="2234169" cy="2203704"/>
+            <a:off x="7114228" y="16829"/>
+            <a:ext cx="2029772" cy="2002094"/>
           </a:xfrm>
           <a:prstGeom prst="rect">
             <a:avLst/>
@@ -8420,8 +8945,8 @@
           </a:extLst>
         </p:spPr>
       </p:pic>
-      <mc:AlternateContent xmlns:mc="http://schemas.openxmlformats.org/markup-compatibility/2006">
-        <mc:Choice xmlns:a14="http://schemas.microsoft.com/office/drawing/2010/main" Requires="a14">
+      <mc:AlternateContent xmlns:mc="http://schemas.openxmlformats.org/markup-compatibility/2006" xmlns:a14="http://schemas.microsoft.com/office/drawing/2010/main">
+        <mc:Choice Requires="a14">
           <p:sp>
             <p:nvSpPr>
               <p:cNvPr id="10" name="TextBox 9">
@@ -8519,7 +9044,7 @@
             </p:txBody>
           </p:sp>
         </mc:Choice>
-        <mc:Fallback>
+        <mc:Fallback xmlns="">
           <p:sp>
             <p:nvSpPr>
               <p:cNvPr id="10" name="TextBox 9">
@@ -8564,8 +9089,8 @@
           </p:sp>
         </mc:Fallback>
       </mc:AlternateContent>
-      <mc:AlternateContent xmlns:mc="http://schemas.openxmlformats.org/markup-compatibility/2006">
-        <mc:Choice xmlns:a14="http://schemas.microsoft.com/office/drawing/2010/main" Requires="a14">
+      <mc:AlternateContent xmlns:mc="http://schemas.openxmlformats.org/markup-compatibility/2006" xmlns:a14="http://schemas.microsoft.com/office/drawing/2010/main">
+        <mc:Choice Requires="a14">
           <p:sp>
             <p:nvSpPr>
               <p:cNvPr id="11" name="TextBox 10">
@@ -8669,7 +9194,7 @@
             </p:txBody>
           </p:sp>
         </mc:Choice>
-        <mc:Fallback>
+        <mc:Fallback xmlns="">
           <p:sp>
             <p:nvSpPr>
               <p:cNvPr id="11" name="TextBox 10">
@@ -8714,6 +9239,44 @@
           </p:sp>
         </mc:Fallback>
       </mc:AlternateContent>
+      <p:sp>
+        <p:nvSpPr>
+          <p:cNvPr id="4" name="TextBox 3">
+            <a:extLst>
+              <a:ext uri="{FF2B5EF4-FFF2-40B4-BE49-F238E27FC236}">
+                <a16:creationId xmlns:a16="http://schemas.microsoft.com/office/drawing/2014/main" id="{5D5743EF-03EC-1477-8BCB-379D06A8F5D7}"/>
+              </a:ext>
+            </a:extLst>
+          </p:cNvPr>
+          <p:cNvSpPr txBox="1"/>
+          <p:nvPr/>
+        </p:nvSpPr>
+        <p:spPr>
+          <a:xfrm>
+            <a:off x="7634108" y="1898891"/>
+            <a:ext cx="1605519" cy="307777"/>
+          </a:xfrm>
+          <a:prstGeom prst="rect">
+            <a:avLst/>
+          </a:prstGeom>
+          <a:noFill/>
+        </p:spPr>
+        <p:txBody>
+          <a:bodyPr wrap="square">
+            <a:spAutoFit/>
+          </a:bodyPr>
+          <a:lstStyle/>
+          <a:p>
+            <a:r>
+              <a:rPr lang="en-US" sz="1400" b="0" i="0" u="none" strike="noStrike" baseline="0" dirty="0">
+                <a:latin typeface="HelveticaNeue"/>
+              </a:rPr>
+              <a:t>Credit: Wikipedia</a:t>
+            </a:r>
+            <a:endParaRPr lang="en-US" sz="1600" dirty="0"/>
+          </a:p>
+        </p:txBody>
+      </p:sp>
     </p:spTree>
     <p:extLst>
       <p:ext uri="{BB962C8B-B14F-4D97-AF65-F5344CB8AC3E}">
@@ -8851,7 +9414,7 @@
 </p:sld>
 </file>
 
-<file path=ppt/slides/slide24.xml><?xml version="1.0" encoding="utf-8"?>
+<file path=ppt/slides/slide26.xml><?xml version="1.0" encoding="utf-8"?>
 <p:sld xmlns:a="http://schemas.openxmlformats.org/drawingml/2006/main" xmlns:r="http://schemas.openxmlformats.org/officeDocument/2006/relationships" xmlns:p="http://schemas.openxmlformats.org/presentationml/2006/main">
   <p:cSld>
     <p:spTree>
@@ -9333,7 +9896,7 @@
 </p:sld>
 </file>
 
-<file path=ppt/slides/slide25.xml><?xml version="1.0" encoding="utf-8"?>
+<file path=ppt/slides/slide27.xml><?xml version="1.0" encoding="utf-8"?>
 <p:sld xmlns:a="http://schemas.openxmlformats.org/drawingml/2006/main" xmlns:r="http://schemas.openxmlformats.org/officeDocument/2006/relationships" xmlns:p="http://schemas.openxmlformats.org/presentationml/2006/main">
   <p:cSld>
     <p:spTree>
@@ -9973,7 +10536,7 @@
 </p:sld>
 </file>
 
-<file path=ppt/slides/slide26.xml><?xml version="1.0" encoding="utf-8"?>
+<file path=ppt/slides/slide28.xml><?xml version="1.0" encoding="utf-8"?>
 <p:sld xmlns:a="http://schemas.openxmlformats.org/drawingml/2006/main" xmlns:r="http://schemas.openxmlformats.org/officeDocument/2006/relationships" xmlns:p="http://schemas.openxmlformats.org/presentationml/2006/main">
   <p:cSld>
     <p:spTree>
@@ -10116,509 +10679,6 @@
     <p:extLst>
       <p:ext uri="{BB962C8B-B14F-4D97-AF65-F5344CB8AC3E}">
         <p14:creationId xmlns:p14="http://schemas.microsoft.com/office/powerpoint/2010/main" val="760899132"/>
-      </p:ext>
-    </p:extLst>
-  </p:cSld>
-  <p:clrMapOvr>
-    <a:masterClrMapping/>
-  </p:clrMapOvr>
-</p:sld>
-</file>
-
-<file path=ppt/slides/slide27.xml><?xml version="1.0" encoding="utf-8"?>
-<p:sld xmlns:a="http://schemas.openxmlformats.org/drawingml/2006/main" xmlns:r="http://schemas.openxmlformats.org/officeDocument/2006/relationships" xmlns:p="http://schemas.openxmlformats.org/presentationml/2006/main">
-  <p:cSld>
-    <p:spTree>
-      <p:nvGrpSpPr>
-        <p:cNvPr id="1" name=""/>
-        <p:cNvGrpSpPr/>
-        <p:nvPr/>
-      </p:nvGrpSpPr>
-      <p:grpSpPr>
-        <a:xfrm>
-          <a:off x="0" y="0"/>
-          <a:ext cx="0" cy="0"/>
-          <a:chOff x="0" y="0"/>
-          <a:chExt cx="0" cy="0"/>
-        </a:xfrm>
-      </p:grpSpPr>
-      <p:sp>
-        <p:nvSpPr>
-          <p:cNvPr id="2" name="Title 1">
-            <a:extLst>
-              <a:ext uri="{FF2B5EF4-FFF2-40B4-BE49-F238E27FC236}">
-                <a16:creationId xmlns:a16="http://schemas.microsoft.com/office/drawing/2014/main" id="{2E7D397F-CE0B-EB20-A6D1-2EB5AF5A80D7}"/>
-              </a:ext>
-            </a:extLst>
-          </p:cNvPr>
-          <p:cNvSpPr>
-            <a:spLocks noGrp="1"/>
-          </p:cNvSpPr>
-          <p:nvPr>
-            <p:ph type="title"/>
-          </p:nvPr>
-        </p:nvSpPr>
-        <p:spPr/>
-        <p:txBody>
-          <a:bodyPr/>
-          <a:lstStyle/>
-          <a:p>
-            <a:r>
-              <a:rPr lang="en-CA" dirty="0"/>
-              <a:t>Confidence Intervals</a:t>
-            </a:r>
-            <a:endParaRPr lang="en-US" dirty="0"/>
-          </a:p>
-        </p:txBody>
-      </p:sp>
-      <mc:AlternateContent xmlns:mc="http://schemas.openxmlformats.org/markup-compatibility/2006">
-        <mc:Choice xmlns:a14="http://schemas.microsoft.com/office/drawing/2010/main" Requires="a14">
-          <p:sp>
-            <p:nvSpPr>
-              <p:cNvPr id="3" name="Text Placeholder 2">
-                <a:extLst>
-                  <a:ext uri="{FF2B5EF4-FFF2-40B4-BE49-F238E27FC236}">
-                    <a16:creationId xmlns:a16="http://schemas.microsoft.com/office/drawing/2014/main" id="{15CB0082-C2BE-0282-EF44-77975DEDF22D}"/>
-                  </a:ext>
-                </a:extLst>
-              </p:cNvPr>
-              <p:cNvSpPr>
-                <a:spLocks noGrp="1"/>
-              </p:cNvSpPr>
-              <p:nvPr>
-                <p:ph type="body" idx="1"/>
-              </p:nvPr>
-            </p:nvSpPr>
-            <p:spPr>
-              <a:xfrm>
-                <a:off x="628650" y="1643432"/>
-                <a:ext cx="4134426" cy="4606723"/>
-              </a:xfrm>
-            </p:spPr>
-            <p:txBody>
-              <a:bodyPr/>
-              <a:lstStyle/>
-              <a:p>
-                <a:pPr marL="342900" indent="-342900">
-                  <a:buFont typeface="Arial" panose="020B0604020202020204" pitchFamily="34" charset="0"/>
-                  <a:buChar char="•"/>
-                </a:pPr>
-                <a:r>
-                  <a:rPr lang="en-CA" dirty="0"/>
-                  <a:t>We may want to attribute a range to our estimate</a:t>
-                </a:r>
-              </a:p>
-              <a:p>
-                <a:pPr marL="342900" indent="-342900">
-                  <a:buFont typeface="Arial" panose="020B0604020202020204" pitchFamily="34" charset="0"/>
-                  <a:buChar char="•"/>
-                </a:pPr>
-                <a:endParaRPr lang="en-CA" dirty="0"/>
-              </a:p>
-              <a:p>
-                <a:pPr marL="342900" indent="-342900">
-                  <a:buFont typeface="Arial" panose="020B0604020202020204" pitchFamily="34" charset="0"/>
-                  <a:buChar char="•"/>
-                </a:pPr>
-                <a:r>
-                  <a:rPr lang="en-CA" dirty="0"/>
-                  <a:t>Can be calculated with the </a:t>
-                </a:r>
-                <a:r>
-                  <a:rPr lang="en-CA" b="1" dirty="0"/>
-                  <a:t>margin of error</a:t>
-                </a:r>
-              </a:p>
-              <a:p>
-                <a:pPr/>
-                <a14:m>
-                  <m:oMathPara xmlns:m="http://schemas.openxmlformats.org/officeDocument/2006/math">
-                    <m:oMathParaPr>
-                      <m:jc m:val="centerGroup"/>
-                    </m:oMathParaPr>
-                    <m:oMath xmlns:m="http://schemas.openxmlformats.org/officeDocument/2006/math">
-                      <m:r>
-                        <a:rPr lang="en-CA" b="0" i="1" smtClean="0">
-                          <a:latin typeface="Cambria Math" panose="02040503050406030204" pitchFamily="18" charset="0"/>
-                        </a:rPr>
-                        <m:t>𝐸</m:t>
-                      </m:r>
-                      <m:r>
-                        <a:rPr lang="en-CA" b="0" i="1" smtClean="0">
-                          <a:latin typeface="Cambria Math" panose="02040503050406030204" pitchFamily="18" charset="0"/>
-                        </a:rPr>
-                        <m:t>=</m:t>
-                      </m:r>
-                      <m:r>
-                        <a:rPr lang="en-CA" b="0" i="1" smtClean="0">
-                          <a:latin typeface="Cambria Math" panose="02040503050406030204" pitchFamily="18" charset="0"/>
-                        </a:rPr>
-                        <m:t>𝑍</m:t>
-                      </m:r>
-                      <m:f>
-                        <m:fPr>
-                          <m:ctrlPr>
-                            <a:rPr lang="en-CA" b="0" i="1" smtClean="0">
-                              <a:latin typeface="Cambria Math" panose="02040503050406030204" pitchFamily="18" charset="0"/>
-                            </a:rPr>
-                          </m:ctrlPr>
-                        </m:fPr>
-                        <m:num>
-                          <m:r>
-                            <a:rPr lang="en-CA" b="0" i="1" smtClean="0">
-                              <a:latin typeface="Cambria Math" panose="02040503050406030204" pitchFamily="18" charset="0"/>
-                            </a:rPr>
-                            <m:t>𝜎</m:t>
-                          </m:r>
-                        </m:num>
-                        <m:den>
-                          <m:rad>
-                            <m:radPr>
-                              <m:degHide m:val="on"/>
-                              <m:ctrlPr>
-                                <a:rPr lang="en-CA" b="0" i="1" smtClean="0">
-                                  <a:latin typeface="Cambria Math" panose="02040503050406030204" pitchFamily="18" charset="0"/>
-                                </a:rPr>
-                              </m:ctrlPr>
-                            </m:radPr>
-                            <m:deg/>
-                            <m:e>
-                              <m:r>
-                                <a:rPr lang="en-CA" b="0" i="1" smtClean="0">
-                                  <a:latin typeface="Cambria Math" panose="02040503050406030204" pitchFamily="18" charset="0"/>
-                                </a:rPr>
-                                <m:t>𝑛</m:t>
-                              </m:r>
-                            </m:e>
-                          </m:rad>
-                        </m:den>
-                      </m:f>
-                    </m:oMath>
-                  </m:oMathPara>
-                </a14:m>
-                <a:endParaRPr lang="en-CA" b="0" dirty="0"/>
-              </a:p>
-              <a:p>
-                <a:pPr marL="342900" indent="-342900">
-                  <a:buFont typeface="Arial" panose="020B0604020202020204" pitchFamily="34" charset="0"/>
-                  <a:buChar char="•"/>
-                </a:pPr>
-                <a:endParaRPr lang="en-CA" dirty="0"/>
-              </a:p>
-              <a:p>
-                <a:pPr marL="342900" indent="-342900">
-                  <a:buFont typeface="Arial" panose="020B0604020202020204" pitchFamily="34" charset="0"/>
-                  <a:buChar char="•"/>
-                </a:pPr>
-                <a:r>
-                  <a:rPr lang="en-CA" dirty="0"/>
-                  <a:t>Where Z is the z-score that defines our confidence level</a:t>
-                </a:r>
-              </a:p>
-            </p:txBody>
-          </p:sp>
-        </mc:Choice>
-        <mc:Fallback>
-          <p:sp>
-            <p:nvSpPr>
-              <p:cNvPr id="3" name="Text Placeholder 2">
-                <a:extLst>
-                  <a:ext uri="{FF2B5EF4-FFF2-40B4-BE49-F238E27FC236}">
-                    <a16:creationId xmlns:a16="http://schemas.microsoft.com/office/drawing/2014/main" id="{15CB0082-C2BE-0282-EF44-77975DEDF22D}"/>
-                  </a:ext>
-                </a:extLst>
-              </p:cNvPr>
-              <p:cNvSpPr>
-                <a:spLocks noGrp="1" noRot="1" noChangeAspect="1" noMove="1" noResize="1" noEditPoints="1" noAdjustHandles="1" noChangeArrowheads="1" noChangeShapeType="1" noTextEdit="1"/>
-              </p:cNvSpPr>
-              <p:nvPr>
-                <p:ph type="body" idx="1"/>
-              </p:nvPr>
-            </p:nvSpPr>
-            <p:spPr>
-              <a:xfrm>
-                <a:off x="628650" y="1643432"/>
-                <a:ext cx="4134426" cy="4606723"/>
-              </a:xfrm>
-              <a:blipFill>
-                <a:blip r:embed="rId2"/>
-                <a:stretch>
-                  <a:fillRect l="-1917" t="-1854"/>
-                </a:stretch>
-              </a:blipFill>
-            </p:spPr>
-            <p:txBody>
-              <a:bodyPr/>
-              <a:lstStyle/>
-              <a:p>
-                <a:r>
-                  <a:rPr lang="en-US">
-                    <a:noFill/>
-                  </a:rPr>
-                  <a:t> </a:t>
-                </a:r>
-              </a:p>
-            </p:txBody>
-          </p:sp>
-        </mc:Fallback>
-      </mc:AlternateContent>
-      <p:pic>
-        <p:nvPicPr>
-          <p:cNvPr id="9218" name="Picture 2">
-            <a:extLst>
-              <a:ext uri="{FF2B5EF4-FFF2-40B4-BE49-F238E27FC236}">
-                <a16:creationId xmlns:a16="http://schemas.microsoft.com/office/drawing/2014/main" id="{6E410117-D63E-D18C-891D-0E74E617E39A}"/>
-              </a:ext>
-            </a:extLst>
-          </p:cNvPr>
-          <p:cNvPicPr>
-            <a:picLocks noChangeAspect="1" noChangeArrowheads="1"/>
-          </p:cNvPicPr>
-          <p:nvPr/>
-        </p:nvPicPr>
-        <p:blipFill>
-          <a:blip r:embed="rId3">
-            <a:extLst>
-              <a:ext uri="{28A0092B-C50C-407E-A947-70E740481C1C}">
-                <a14:useLocalDpi xmlns:a14="http://schemas.microsoft.com/office/drawing/2010/main" val="0"/>
-              </a:ext>
-            </a:extLst>
-          </a:blip>
-          <a:srcRect/>
-          <a:stretch>
-            <a:fillRect/>
-          </a:stretch>
-        </p:blipFill>
-        <p:spPr bwMode="auto">
-          <a:xfrm>
-            <a:off x="5286375" y="2243014"/>
-            <a:ext cx="3790950" cy="3291234"/>
-          </a:xfrm>
-          <a:prstGeom prst="rect">
-            <a:avLst/>
-          </a:prstGeom>
-          <a:noFill/>
-          <a:extLst>
-            <a:ext uri="{909E8E84-426E-40DD-AFC4-6F175D3DCCD1}">
-              <a14:hiddenFill xmlns:a14="http://schemas.microsoft.com/office/drawing/2010/main">
-                <a:solidFill>
-                  <a:srgbClr val="FFFFFF"/>
-                </a:solidFill>
-              </a14:hiddenFill>
-            </a:ext>
-          </a:extLst>
-        </p:spPr>
-      </p:pic>
-    </p:spTree>
-    <p:extLst>
-      <p:ext uri="{BB962C8B-B14F-4D97-AF65-F5344CB8AC3E}">
-        <p14:creationId xmlns:p14="http://schemas.microsoft.com/office/powerpoint/2010/main" val="1000633892"/>
-      </p:ext>
-    </p:extLst>
-  </p:cSld>
-  <p:clrMapOvr>
-    <a:masterClrMapping/>
-  </p:clrMapOvr>
-</p:sld>
-</file>
-
-<file path=ppt/slides/slide28.xml><?xml version="1.0" encoding="utf-8"?>
-<p:sld xmlns:a="http://schemas.openxmlformats.org/drawingml/2006/main" xmlns:r="http://schemas.openxmlformats.org/officeDocument/2006/relationships" xmlns:p="http://schemas.openxmlformats.org/presentationml/2006/main">
-  <p:cSld>
-    <p:spTree>
-      <p:nvGrpSpPr>
-        <p:cNvPr id="1" name=""/>
-        <p:cNvGrpSpPr/>
-        <p:nvPr/>
-      </p:nvGrpSpPr>
-      <p:grpSpPr>
-        <a:xfrm>
-          <a:off x="0" y="0"/>
-          <a:ext cx="0" cy="0"/>
-          <a:chOff x="0" y="0"/>
-          <a:chExt cx="0" cy="0"/>
-        </a:xfrm>
-      </p:grpSpPr>
-      <p:sp>
-        <p:nvSpPr>
-          <p:cNvPr id="2" name="Title 1">
-            <a:extLst>
-              <a:ext uri="{FF2B5EF4-FFF2-40B4-BE49-F238E27FC236}">
-                <a16:creationId xmlns:a16="http://schemas.microsoft.com/office/drawing/2014/main" id="{5568DD53-0E60-48D4-A0EE-A8930702EFE2}"/>
-              </a:ext>
-            </a:extLst>
-          </p:cNvPr>
-          <p:cNvSpPr>
-            <a:spLocks noGrp="1"/>
-          </p:cNvSpPr>
-          <p:nvPr>
-            <p:ph type="title"/>
-          </p:nvPr>
-        </p:nvSpPr>
-        <p:spPr/>
-        <p:txBody>
-          <a:bodyPr>
-            <a:normAutofit fontScale="90000"/>
-          </a:bodyPr>
-          <a:lstStyle/>
-          <a:p>
-            <a:r>
-              <a:rPr lang="en-CA" dirty="0"/>
-              <a:t>PSA: Confidence Intervals</a:t>
-            </a:r>
-            <a:endParaRPr lang="en-US" dirty="0"/>
-          </a:p>
-        </p:txBody>
-      </p:sp>
-      <p:sp>
-        <p:nvSpPr>
-          <p:cNvPr id="3" name="Text Placeholder 2">
-            <a:extLst>
-              <a:ext uri="{FF2B5EF4-FFF2-40B4-BE49-F238E27FC236}">
-                <a16:creationId xmlns:a16="http://schemas.microsoft.com/office/drawing/2014/main" id="{F96E63DE-6149-CC4F-C3C8-3C7CD447355A}"/>
-              </a:ext>
-            </a:extLst>
-          </p:cNvPr>
-          <p:cNvSpPr>
-            <a:spLocks noGrp="1"/>
-          </p:cNvSpPr>
-          <p:nvPr>
-            <p:ph type="body" idx="1"/>
-          </p:nvPr>
-        </p:nvSpPr>
-        <p:spPr>
-          <a:xfrm>
-            <a:off x="194332" y="2476984"/>
-            <a:ext cx="4377668" cy="3426106"/>
-          </a:xfrm>
-        </p:spPr>
-        <p:txBody>
-          <a:bodyPr>
-            <a:normAutofit fontScale="92500"/>
-          </a:bodyPr>
-          <a:lstStyle/>
-          <a:p>
-            <a:r>
-              <a:rPr lang="en-CA" dirty="0"/>
-              <a:t>A  95% CI </a:t>
-            </a:r>
-            <a:r>
-              <a:rPr lang="en-CA" b="1" dirty="0"/>
-              <a:t>DOES NOT mean </a:t>
-            </a:r>
-            <a:r>
-              <a:rPr lang="en-CA" dirty="0"/>
-              <a:t>there is a 95% chance the true value is in that range</a:t>
-            </a:r>
-          </a:p>
-          <a:p>
-            <a:endParaRPr lang="en-CA" dirty="0"/>
-          </a:p>
-          <a:p>
-            <a:r>
-              <a:rPr lang="en-CA" b="1" dirty="0"/>
-              <a:t>For multiple experiments, 95% of CIs will overlap with the true value</a:t>
-            </a:r>
-          </a:p>
-          <a:p>
-            <a:endParaRPr lang="en-CA" sz="2000" b="1" dirty="0"/>
-          </a:p>
-          <a:p>
-            <a:r>
-              <a:rPr lang="en-CA" b="1" dirty="0"/>
-              <a:t>Consider a Bayesian formulation instead (beyond scope)</a:t>
-            </a:r>
-            <a:endParaRPr lang="en-US" b="1" dirty="0"/>
-          </a:p>
-        </p:txBody>
-      </p:sp>
-      <p:pic>
-        <p:nvPicPr>
-          <p:cNvPr id="1026" name="Picture 2" descr="undefined">
-            <a:extLst>
-              <a:ext uri="{FF2B5EF4-FFF2-40B4-BE49-F238E27FC236}">
-                <a16:creationId xmlns:a16="http://schemas.microsoft.com/office/drawing/2014/main" id="{4B9737DD-DF68-9500-CA63-977850AACB2C}"/>
-              </a:ext>
-            </a:extLst>
-          </p:cNvPr>
-          <p:cNvPicPr>
-            <a:picLocks noChangeAspect="1" noChangeArrowheads="1"/>
-          </p:cNvPicPr>
-          <p:nvPr/>
-        </p:nvPicPr>
-        <p:blipFill>
-          <a:blip r:embed="rId2">
-            <a:extLst>
-              <a:ext uri="{28A0092B-C50C-407E-A947-70E740481C1C}">
-                <a14:useLocalDpi xmlns:a14="http://schemas.microsoft.com/office/drawing/2010/main" val="0"/>
-              </a:ext>
-            </a:extLst>
-          </a:blip>
-          <a:srcRect/>
-          <a:stretch>
-            <a:fillRect/>
-          </a:stretch>
-        </p:blipFill>
-        <p:spPr bwMode="auto">
-          <a:xfrm>
-            <a:off x="4572000" y="1643432"/>
-            <a:ext cx="4470265" cy="4470265"/>
-          </a:xfrm>
-          <a:prstGeom prst="rect">
-            <a:avLst/>
-          </a:prstGeom>
-          <a:noFill/>
-          <a:extLst>
-            <a:ext uri="{909E8E84-426E-40DD-AFC4-6F175D3DCCD1}">
-              <a14:hiddenFill xmlns:a14="http://schemas.microsoft.com/office/drawing/2010/main">
-                <a:solidFill>
-                  <a:srgbClr val="FFFFFF"/>
-                </a:solidFill>
-              </a14:hiddenFill>
-            </a:ext>
-          </a:extLst>
-        </p:spPr>
-      </p:pic>
-      <p:sp>
-        <p:nvSpPr>
-          <p:cNvPr id="4" name="TextBox 3">
-            <a:extLst>
-              <a:ext uri="{FF2B5EF4-FFF2-40B4-BE49-F238E27FC236}">
-                <a16:creationId xmlns:a16="http://schemas.microsoft.com/office/drawing/2014/main" id="{CCF16B3C-8FD9-EF69-6A29-E55F05E405EE}"/>
-              </a:ext>
-            </a:extLst>
-          </p:cNvPr>
-          <p:cNvSpPr txBox="1"/>
-          <p:nvPr/>
-        </p:nvSpPr>
-        <p:spPr>
-          <a:xfrm>
-            <a:off x="7072132" y="1643432"/>
-            <a:ext cx="868101" cy="369460"/>
-          </a:xfrm>
-          <a:prstGeom prst="rect">
-            <a:avLst/>
-          </a:prstGeom>
-          <a:noFill/>
-        </p:spPr>
-        <p:txBody>
-          <a:bodyPr wrap="square" rtlCol="0">
-            <a:spAutoFit/>
-          </a:bodyPr>
-          <a:lstStyle/>
-          <a:p>
-            <a:r>
-              <a:rPr lang="en-CA" b="1" dirty="0"/>
-              <a:t>50% CI</a:t>
-            </a:r>
-            <a:endParaRPr lang="en-US" b="1" dirty="0"/>
-          </a:p>
-        </p:txBody>
-      </p:sp>
-    </p:spTree>
-    <p:extLst>
-      <p:ext uri="{BB962C8B-B14F-4D97-AF65-F5344CB8AC3E}">
-        <p14:creationId xmlns:p14="http://schemas.microsoft.com/office/powerpoint/2010/main" val="443152693"/>
       </p:ext>
     </p:extLst>
   </p:cSld>

</xml_diff>